<commit_message>
Updated files feb 1 2021
</commit_message>
<xml_diff>
--- a/week8/day5/theory/Machine Learning - Knn.pptx
+++ b/week8/day5/theory/Machine Learning - Knn.pptx
@@ -227,7 +227,7 @@
           <a:p>
             <a:fld id="{CBC3D06E-D880-4630-85C6-508F7CA16EC0}" type="datetimeFigureOut">
               <a:rPr lang="es-ES" smtClean="0"/>
-              <a:t>27/01/2021</a:t>
+              <a:t>28/01/2021</a:t>
             </a:fld>
             <a:endParaRPr lang="es-ES"/>
           </a:p>
@@ -1595,7 +1595,7 @@
             <a:fld id="{1E700B27-DE4C-4B9E-BB11-B9027034A00F}" type="datetimeFigureOut">
               <a:rPr lang="en-US" smtClean="0"/>
               <a:pPr/>
-              <a:t>1/27/2021</a:t>
+              <a:t>1/28/2021</a:t>
             </a:fld>
             <a:endParaRPr lang="en-US" dirty="0"/>
           </a:p>
@@ -1766,7 +1766,7 @@
           <a:p>
             <a:fld id="{80DBE609-F3F2-45E6-BD6A-E03A8C86C1AE}" type="datetimeFigureOut">
               <a:rPr lang="en-US" smtClean="0"/>
-              <a:t>1/27/2021</a:t>
+              <a:t>1/28/2021</a:t>
             </a:fld>
             <a:endParaRPr lang="en-US" dirty="0"/>
           </a:p>
@@ -1947,7 +1947,7 @@
           <a:p>
             <a:fld id="{7A24AD68-089C-4467-A8F3-EA2BBCA6B44E}" type="datetimeFigureOut">
               <a:rPr lang="en-US" smtClean="0"/>
-              <a:t>1/27/2021</a:t>
+              <a:t>1/28/2021</a:t>
             </a:fld>
             <a:endParaRPr lang="en-US" dirty="0"/>
           </a:p>
@@ -2118,7 +2118,7 @@
           <a:p>
             <a:fld id="{75C51FCE-E4BB-4680-8E50-3C0E348D2609}" type="datetimeFigureOut">
               <a:rPr lang="en-US" smtClean="0"/>
-              <a:t>1/27/2021</a:t>
+              <a:t>1/28/2021</a:t>
             </a:fld>
             <a:endParaRPr lang="en-US" dirty="0"/>
           </a:p>
@@ -2365,7 +2365,7 @@
           <a:p>
             <a:fld id="{8AAA073D-A903-47F8-8D16-77642FB0DF1F}" type="datetimeFigureOut">
               <a:rPr lang="en-US" smtClean="0"/>
-              <a:t>1/27/2021</a:t>
+              <a:t>1/28/2021</a:t>
             </a:fld>
             <a:endParaRPr lang="en-US" dirty="0"/>
           </a:p>
@@ -2598,7 +2598,7 @@
           <a:p>
             <a:fld id="{AB91FA40-626B-4CA1-85D0-7A9016E395BA}" type="datetimeFigureOut">
               <a:rPr lang="en-US" smtClean="0"/>
-              <a:t>1/27/2021</a:t>
+              <a:t>1/28/2021</a:t>
             </a:fld>
             <a:endParaRPr lang="en-US" dirty="0"/>
           </a:p>
@@ -2966,7 +2966,7 @@
           <a:p>
             <a:fld id="{C3F425EA-B9DC-48A7-991E-9A82573B1B21}" type="datetimeFigureOut">
               <a:rPr lang="en-US" smtClean="0"/>
-              <a:t>1/27/2021</a:t>
+              <a:t>1/28/2021</a:t>
             </a:fld>
             <a:endParaRPr lang="en-US" dirty="0"/>
           </a:p>
@@ -3085,7 +3085,7 @@
           <a:p>
             <a:fld id="{66CB97F8-6CEB-469B-AFCC-889F2A2B1D5A}" type="datetimeFigureOut">
               <a:rPr lang="en-US" smtClean="0"/>
-              <a:t>1/27/2021</a:t>
+              <a:t>1/28/2021</a:t>
             </a:fld>
             <a:endParaRPr lang="en-US" dirty="0"/>
           </a:p>
@@ -3181,7 +3181,7 @@
           <a:p>
             <a:fld id="{8FA9179F-009E-4FA5-B091-7EBB82A185BD}" type="datetimeFigureOut">
               <a:rPr lang="en-US" smtClean="0"/>
-              <a:t>1/27/2021</a:t>
+              <a:t>1/28/2021</a:t>
             </a:fld>
             <a:endParaRPr lang="en-US" dirty="0"/>
           </a:p>
@@ -3459,7 +3459,7 @@
           <a:p>
             <a:fld id="{8E665CEB-0076-4E37-B880-BCEA9784DE0A}" type="datetimeFigureOut">
               <a:rPr lang="en-US" smtClean="0"/>
-              <a:t>1/27/2021</a:t>
+              <a:t>1/28/2021</a:t>
             </a:fld>
             <a:endParaRPr lang="en-US" dirty="0"/>
           </a:p>
@@ -3717,7 +3717,7 @@
           <a:p>
             <a:fld id="{A6149E5E-3896-4118-99A7-7B85668F1C5E}" type="datetimeFigureOut">
               <a:rPr lang="en-US" smtClean="0"/>
-              <a:t>1/27/2021</a:t>
+              <a:t>1/28/2021</a:t>
             </a:fld>
             <a:endParaRPr lang="en-US" dirty="0"/>
           </a:p>
@@ -3931,7 +3931,7 @@
           <a:p>
             <a:fld id="{7E0D914D-B099-4142-A885-11F276715148}" type="datetimeFigureOut">
               <a:rPr lang="en-US" smtClean="0"/>
-              <a:t>1/27/2021</a:t>
+              <a:t>1/28/2021</a:t>
             </a:fld>
             <a:endParaRPr lang="en-US" dirty="0"/>
           </a:p>

</xml_diff>